<commit_message>
Corrections et 1 slide enlevée
</commit_message>
<xml_diff>
--- a/MoneyThoring_pres.pptx
+++ b/MoneyThoring_pres.pptx
@@ -9,25 +9,24 @@
     <p:sldMasterId id="2147483654" r:id="rId5"/>
   </p:sldMasterIdLst>
   <p:notesMasterIdLst>
-    <p:notesMasterId r:id="rId22"/>
+    <p:notesMasterId r:id="rId21"/>
   </p:notesMasterIdLst>
   <p:sldIdLst>
     <p:sldId id="269" r:id="rId6"/>
-    <p:sldId id="524" r:id="rId7"/>
-    <p:sldId id="437" r:id="rId8"/>
-    <p:sldId id="274" r:id="rId9"/>
-    <p:sldId id="282" r:id="rId10"/>
-    <p:sldId id="519" r:id="rId11"/>
-    <p:sldId id="518" r:id="rId12"/>
-    <p:sldId id="339" r:id="rId13"/>
-    <p:sldId id="402" r:id="rId14"/>
-    <p:sldId id="517" r:id="rId15"/>
-    <p:sldId id="520" r:id="rId16"/>
-    <p:sldId id="521" r:id="rId17"/>
-    <p:sldId id="516" r:id="rId18"/>
-    <p:sldId id="522" r:id="rId19"/>
-    <p:sldId id="523" r:id="rId20"/>
-    <p:sldId id="370" r:id="rId21"/>
+    <p:sldId id="437" r:id="rId7"/>
+    <p:sldId id="274" r:id="rId8"/>
+    <p:sldId id="282" r:id="rId9"/>
+    <p:sldId id="519" r:id="rId10"/>
+    <p:sldId id="518" r:id="rId11"/>
+    <p:sldId id="339" r:id="rId12"/>
+    <p:sldId id="402" r:id="rId13"/>
+    <p:sldId id="517" r:id="rId14"/>
+    <p:sldId id="520" r:id="rId15"/>
+    <p:sldId id="521" r:id="rId16"/>
+    <p:sldId id="516" r:id="rId17"/>
+    <p:sldId id="522" r:id="rId18"/>
+    <p:sldId id="523" r:id="rId19"/>
+    <p:sldId id="370" r:id="rId20"/>
   </p:sldIdLst>
   <p:sldSz cx="12192000" cy="6858000"/>
   <p:notesSz cx="6858000" cy="9144000"/>
@@ -644,7 +643,7 @@
           <a:p>
             <a:fld id="{250503B6-F4CD-DE49-AB30-479371E8558D}" type="slidenum">
               <a:rPr lang="en-US" smtClean="0"/>
-              <a:t>3</a:t>
+              <a:t>2</a:t>
             </a:fld>
             <a:endParaRPr lang="en-US"/>
           </a:p>
@@ -728,7 +727,7 @@
           <a:p>
             <a:fld id="{250503B6-F4CD-DE49-AB30-479371E8558D}" type="slidenum">
               <a:rPr lang="en-US" smtClean="0"/>
-              <a:t>4</a:t>
+              <a:t>3</a:t>
             </a:fld>
             <a:endParaRPr lang="en-US"/>
           </a:p>
@@ -815,7 +814,7 @@
           <a:p>
             <a:fld id="{250503B6-F4CD-DE49-AB30-479371E8558D}" type="slidenum">
               <a:rPr lang="en-US" smtClean="0"/>
-              <a:t>5</a:t>
+              <a:t>4</a:t>
             </a:fld>
             <a:endParaRPr lang="en-US"/>
           </a:p>
@@ -902,7 +901,7 @@
           <a:p>
             <a:fld id="{250503B6-F4CD-DE49-AB30-479371E8558D}" type="slidenum">
               <a:rPr lang="en-US" smtClean="0"/>
-              <a:t>6</a:t>
+              <a:t>5</a:t>
             </a:fld>
             <a:endParaRPr lang="en-US"/>
           </a:p>
@@ -986,7 +985,7 @@
           <a:p>
             <a:fld id="{250503B6-F4CD-DE49-AB30-479371E8558D}" type="slidenum">
               <a:rPr lang="en-US" smtClean="0"/>
-              <a:t>7</a:t>
+              <a:t>6</a:t>
             </a:fld>
             <a:endParaRPr lang="en-US"/>
           </a:p>
@@ -1070,7 +1069,7 @@
           <a:p>
             <a:fld id="{250503B6-F4CD-DE49-AB30-479371E8558D}" type="slidenum">
               <a:rPr lang="en-US" smtClean="0"/>
-              <a:t>9</a:t>
+              <a:t>8</a:t>
             </a:fld>
             <a:endParaRPr lang="en-US"/>
           </a:p>
@@ -1154,7 +1153,7 @@
           <a:p>
             <a:fld id="{250503B6-F4CD-DE49-AB30-479371E8558D}" type="slidenum">
               <a:rPr lang="en-US" smtClean="0"/>
-              <a:t>10</a:t>
+              <a:t>9</a:t>
             </a:fld>
             <a:endParaRPr lang="en-US"/>
           </a:p>
@@ -1238,7 +1237,7 @@
           <a:p>
             <a:fld id="{250503B6-F4CD-DE49-AB30-479371E8558D}" type="slidenum">
               <a:rPr lang="en-US" smtClean="0"/>
-              <a:t>16</a:t>
+              <a:t>15</a:t>
             </a:fld>
             <a:endParaRPr lang="en-US"/>
           </a:p>
@@ -8763,139 +8762,6 @@
           <a:chExt cx="0" cy="0"/>
         </a:xfrm>
       </p:grpSpPr>
-      <p:pic>
-        <p:nvPicPr>
-          <p:cNvPr id="15" name="Picture 14">
-            <a:extLst>
-              <a:ext uri="{FF2B5EF4-FFF2-40B4-BE49-F238E27FC236}">
-                <a16:creationId xmlns:a16="http://schemas.microsoft.com/office/drawing/2014/main" id="{B5A5A9E1-8820-4F02-8952-D9EDF8BE1C33}"/>
-              </a:ext>
-            </a:extLst>
-          </p:cNvPr>
-          <p:cNvPicPr>
-            <a:picLocks noChangeAspect="1"/>
-          </p:cNvPicPr>
-          <p:nvPr/>
-        </p:nvPicPr>
-        <p:blipFill>
-          <a:blip r:embed="rId3" cstate="print">
-            <a:extLst>
-              <a:ext uri="{28A0092B-C50C-407E-A947-70E740481C1C}">
-                <a14:useLocalDpi xmlns:a14="http://schemas.microsoft.com/office/drawing/2010/main" val="0"/>
-              </a:ext>
-            </a:extLst>
-          </a:blip>
-          <a:stretch>
-            <a:fillRect/>
-          </a:stretch>
-        </p:blipFill>
-        <p:spPr>
-          <a:xfrm>
-            <a:off x="5469948" y="1587543"/>
-            <a:ext cx="1252104" cy="1083016"/>
-          </a:xfrm>
-          <a:prstGeom prst="rect">
-            <a:avLst/>
-          </a:prstGeom>
-        </p:spPr>
-      </p:pic>
-      <p:sp>
-        <p:nvSpPr>
-          <p:cNvPr id="42" name="Rectangle 41"/>
-          <p:cNvSpPr/>
-          <p:nvPr/>
-        </p:nvSpPr>
-        <p:spPr>
-          <a:xfrm>
-            <a:off x="1443135" y="3114777"/>
-            <a:ext cx="9305730" cy="707886"/>
-          </a:xfrm>
-          <a:prstGeom prst="rect">
-            <a:avLst/>
-          </a:prstGeom>
-        </p:spPr>
-        <p:txBody>
-          <a:bodyPr wrap="square">
-            <a:spAutoFit/>
-          </a:bodyPr>
-          <a:lstStyle/>
-          <a:p>
-            <a:pPr algn="ctr"/>
-            <a:r>
-              <a:rPr lang="fr-CH" sz="4000" dirty="0">
-                <a:latin typeface="Roboto Light" charset="0"/>
-                <a:ea typeface="Roboto Light" charset="0"/>
-                <a:cs typeface="Roboto Light" charset="0"/>
-              </a:rPr>
-              <a:t>Analyse</a:t>
-            </a:r>
-            <a:r>
-              <a:rPr lang="en-US" sz="4000" dirty="0">
-                <a:latin typeface="Roboto Light" charset="0"/>
-                <a:ea typeface="Roboto Light" charset="0"/>
-                <a:cs typeface="Roboto Light" charset="0"/>
-              </a:rPr>
-              <a:t> du </a:t>
-            </a:r>
-            <a:r>
-              <a:rPr lang="en-US" sz="4000" dirty="0" err="1">
-                <a:latin typeface="Roboto Light" charset="0"/>
-                <a:ea typeface="Roboto Light" charset="0"/>
-                <a:cs typeface="Roboto Light" charset="0"/>
-              </a:rPr>
-              <a:t>projet</a:t>
-            </a:r>
-            <a:endParaRPr lang="en-US" sz="4000" dirty="0">
-              <a:latin typeface="Roboto Light" charset="0"/>
-              <a:ea typeface="Roboto Light" charset="0"/>
-              <a:cs typeface="Roboto Light" charset="0"/>
-            </a:endParaRPr>
-          </a:p>
-        </p:txBody>
-      </p:sp>
-    </p:spTree>
-    <p:extLst>
-      <p:ext uri="{BB962C8B-B14F-4D97-AF65-F5344CB8AC3E}">
-        <p14:creationId xmlns:p14="http://schemas.microsoft.com/office/powerpoint/2010/main" val="616704923"/>
-      </p:ext>
-    </p:extLst>
-  </p:cSld>
-  <p:clrMapOvr>
-    <a:masterClrMapping/>
-  </p:clrMapOvr>
-  <p:transition spd="slow">
-    <p:push dir="u"/>
-  </p:transition>
-</p:sld>
-</file>
-
-<file path=ppt/slides/slide11.xml><?xml version="1.0" encoding="utf-8"?>
-<p:sld xmlns:a="http://schemas.openxmlformats.org/drawingml/2006/main" xmlns:r="http://schemas.openxmlformats.org/officeDocument/2006/relationships" xmlns:p="http://schemas.openxmlformats.org/presentationml/2006/main">
-  <p:cSld>
-    <p:bg>
-      <p:bgPr>
-        <a:solidFill>
-          <a:schemeClr val="bg1">
-            <a:lumMod val="95000"/>
-          </a:schemeClr>
-        </a:solidFill>
-        <a:effectLst/>
-      </p:bgPr>
-    </p:bg>
-    <p:spTree>
-      <p:nvGrpSpPr>
-        <p:cNvPr id="1" name=""/>
-        <p:cNvGrpSpPr/>
-        <p:nvPr/>
-      </p:nvGrpSpPr>
-      <p:grpSpPr>
-        <a:xfrm>
-          <a:off x="0" y="0"/>
-          <a:ext cx="0" cy="0"/>
-          <a:chOff x="0" y="0"/>
-          <a:chExt cx="0" cy="0"/>
-        </a:xfrm>
-      </p:grpSpPr>
       <p:sp>
         <p:nvSpPr>
           <p:cNvPr id="432" name="Shape 432"/>
@@ -8947,7 +8813,7 @@
             <a:fld id="{86CB4B4D-7CA3-9044-876B-883B54F8677D}" type="slidenum">
               <a:rPr lang="en-US" smtClean="0"/>
               <a:pPr lvl="0"/>
-              <a:t>11</a:t>
+              <a:t>10</a:t>
             </a:fld>
             <a:endParaRPr lang="en-US"/>
           </a:p>
@@ -20852,7 +20718,7 @@
 </p:sld>
 </file>
 
-<file path=ppt/slides/slide12.xml><?xml version="1.0" encoding="utf-8"?>
+<file path=ppt/slides/slide11.xml><?xml version="1.0" encoding="utf-8"?>
 <p:sld xmlns:a="http://schemas.openxmlformats.org/drawingml/2006/main" xmlns:r="http://schemas.openxmlformats.org/officeDocument/2006/relationships" xmlns:p="http://schemas.openxmlformats.org/presentationml/2006/main">
   <p:cSld>
     <p:bg>
@@ -20932,7 +20798,7 @@
             <a:fld id="{86CB4B4D-7CA3-9044-876B-883B54F8677D}" type="slidenum">
               <a:rPr lang="en-US" smtClean="0"/>
               <a:pPr lvl="0"/>
-              <a:t>12</a:t>
+              <a:t>11</a:t>
             </a:fld>
             <a:endParaRPr lang="en-US"/>
           </a:p>
@@ -21186,7 +21052,7 @@
 </p:sld>
 </file>
 
-<file path=ppt/slides/slide13.xml><?xml version="1.0" encoding="utf-8"?>
+<file path=ppt/slides/slide12.xml><?xml version="1.0" encoding="utf-8"?>
 <p:sld xmlns:a="http://schemas.openxmlformats.org/drawingml/2006/main" xmlns:r="http://schemas.openxmlformats.org/officeDocument/2006/relationships" xmlns:p="http://schemas.openxmlformats.org/presentationml/2006/main">
   <p:cSld>
     <p:bg>
@@ -21264,7 +21130,7 @@
             <a:fld id="{86CB4B4D-7CA3-9044-876B-883B54F8677D}" type="slidenum">
               <a:rPr lang="en-US" smtClean="0"/>
               <a:pPr lvl="0"/>
-              <a:t>13</a:t>
+              <a:t>12</a:t>
             </a:fld>
             <a:endParaRPr lang="en-US"/>
           </a:p>
@@ -23267,7 +23133,7 @@
 </p:sld>
 </file>
 
-<file path=ppt/slides/slide14.xml><?xml version="1.0" encoding="utf-8"?>
+<file path=ppt/slides/slide13.xml><?xml version="1.0" encoding="utf-8"?>
 <p:sld xmlns:a="http://schemas.openxmlformats.org/drawingml/2006/main" xmlns:r="http://schemas.openxmlformats.org/officeDocument/2006/relationships" xmlns:p="http://schemas.openxmlformats.org/presentationml/2006/main">
   <p:cSld>
     <p:bg>
@@ -23347,7 +23213,7 @@
             <a:fld id="{936C95AE-7298-45E1-9514-94AFF5BED89B}" type="slidenum">
               <a:rPr lang="en-US" smtClean="0"/>
               <a:pPr/>
-              <a:t>14</a:t>
+              <a:t>13</a:t>
             </a:fld>
             <a:endParaRPr lang="en-US" dirty="0"/>
           </a:p>
@@ -24781,7 +24647,7 @@
 </p:sld>
 </file>
 
-<file path=ppt/slides/slide15.xml><?xml version="1.0" encoding="utf-8"?>
+<file path=ppt/slides/slide14.xml><?xml version="1.0" encoding="utf-8"?>
 <p:sld xmlns:a="http://schemas.openxmlformats.org/drawingml/2006/main" xmlns:r="http://schemas.openxmlformats.org/officeDocument/2006/relationships" xmlns:p="http://schemas.openxmlformats.org/presentationml/2006/main">
   <p:cSld>
     <p:bg>
@@ -24861,7 +24727,7 @@
             <a:fld id="{936C95AE-7298-45E1-9514-94AFF5BED89B}" type="slidenum">
               <a:rPr lang="en-US" smtClean="0"/>
               <a:pPr/>
-              <a:t>15</a:t>
+              <a:t>14</a:t>
             </a:fld>
             <a:endParaRPr lang="en-US" dirty="0"/>
           </a:p>
@@ -25634,7 +25500,7 @@
 </p:sld>
 </file>
 
-<file path=ppt/slides/slide16.xml><?xml version="1.0" encoding="utf-8"?>
+<file path=ppt/slides/slide15.xml><?xml version="1.0" encoding="utf-8"?>
 <p:sld xmlns:a="http://schemas.openxmlformats.org/drawingml/2006/main" xmlns:r="http://schemas.openxmlformats.org/officeDocument/2006/relationships" xmlns:p="http://schemas.openxmlformats.org/presentationml/2006/main">
   <p:cSld>
     <p:spTree>
@@ -25843,7 +25709,7 @@
                 <a:ea typeface="Roboto Light" charset="0"/>
                 <a:cs typeface="Roboto Light" charset="0"/>
               </a:rPr>
-              <a:t>Question ?</a:t>
+              <a:t>Questions ?</a:t>
             </a:r>
           </a:p>
         </p:txBody>
@@ -25870,7 +25736,7 @@
                 </a:solidFill>
               </a:rPr>
               <a:pPr/>
-              <a:t>16</a:t>
+              <a:t>15</a:t>
             </a:fld>
             <a:endParaRPr lang="en-US" dirty="0">
               <a:solidFill>
@@ -25923,401 +25789,6 @@
           <a:chExt cx="0" cy="0"/>
         </a:xfrm>
       </p:grpSpPr>
-      <p:pic>
-        <p:nvPicPr>
-          <p:cNvPr id="3" name="Picture 2">
-            <a:extLst>
-              <a:ext uri="{FF2B5EF4-FFF2-40B4-BE49-F238E27FC236}">
-                <a16:creationId xmlns:a16="http://schemas.microsoft.com/office/drawing/2014/main" id="{70AF3DB6-1DD3-5043-BE78-C0DB2CEF1BC9}"/>
-              </a:ext>
-            </a:extLst>
-          </p:cNvPr>
-          <p:cNvPicPr>
-            <a:picLocks noChangeAspect="1"/>
-          </p:cNvPicPr>
-          <p:nvPr/>
-        </p:nvPicPr>
-        <p:blipFill>
-          <a:blip r:embed="rId2" cstate="print">
-            <a:extLst>
-              <a:ext uri="{28A0092B-C50C-407E-A947-70E740481C1C}">
-                <a14:useLocalDpi xmlns:a14="http://schemas.microsoft.com/office/drawing/2010/main" val="0"/>
-              </a:ext>
-            </a:extLst>
-          </a:blip>
-          <a:stretch>
-            <a:fillRect/>
-          </a:stretch>
-        </p:blipFill>
-        <p:spPr>
-          <a:xfrm>
-            <a:off x="671323" y="1251114"/>
-            <a:ext cx="3931686" cy="3400739"/>
-          </a:xfrm>
-          <a:prstGeom prst="rect">
-            <a:avLst/>
-          </a:prstGeom>
-        </p:spPr>
-      </p:pic>
-      <p:sp>
-        <p:nvSpPr>
-          <p:cNvPr id="4" name="TextBox 3">
-            <a:extLst>
-              <a:ext uri="{FF2B5EF4-FFF2-40B4-BE49-F238E27FC236}">
-                <a16:creationId xmlns:a16="http://schemas.microsoft.com/office/drawing/2014/main" id="{4AAC4157-A39D-4748-9236-789C5FE812B2}"/>
-              </a:ext>
-            </a:extLst>
-          </p:cNvPr>
-          <p:cNvSpPr txBox="1"/>
-          <p:nvPr/>
-        </p:nvSpPr>
-        <p:spPr>
-          <a:xfrm>
-            <a:off x="5977843" y="1251114"/>
-            <a:ext cx="5146019" cy="3400739"/>
-          </a:xfrm>
-          <a:prstGeom prst="rect">
-            <a:avLst/>
-          </a:prstGeom>
-          <a:solidFill>
-            <a:schemeClr val="bg1"/>
-          </a:solidFill>
-          <a:effectLst>
-            <a:outerShdw blurRad="38100" dist="12700" dir="5400000" algn="ctr" rotWithShape="0">
-              <a:srgbClr val="000000">
-                <a:alpha val="30000"/>
-              </a:srgbClr>
-            </a:outerShdw>
-          </a:effectLst>
-        </p:spPr>
-        <p:txBody>
-          <a:bodyPr wrap="square" lIns="254000" tIns="254000" rIns="254000" bIns="254000" rtlCol="0">
-            <a:spAutoFit/>
-          </a:bodyPr>
-          <a:lstStyle/>
-          <a:p>
-            <a:r>
-              <a:rPr lang="en-US" sz="2400" dirty="0" err="1">
-                <a:solidFill>
-                  <a:schemeClr val="accent2"/>
-                </a:solidFill>
-                <a:latin typeface="Roboto Medium" charset="0"/>
-                <a:ea typeface="Roboto Medium" charset="0"/>
-                <a:cs typeface="Roboto Medium" charset="0"/>
-              </a:rPr>
-              <a:t>Bienvenue</a:t>
-            </a:r>
-            <a:endParaRPr lang="en-US" sz="2400" dirty="0">
-              <a:solidFill>
-                <a:schemeClr val="accent2"/>
-              </a:solidFill>
-              <a:latin typeface="Roboto Medium" charset="0"/>
-              <a:ea typeface="Roboto Medium" charset="0"/>
-              <a:cs typeface="Roboto Medium" charset="0"/>
-            </a:endParaRPr>
-          </a:p>
-          <a:p>
-            <a:pPr>
-              <a:lnSpc>
-                <a:spcPct val="200000"/>
-              </a:lnSpc>
-            </a:pPr>
-            <a:endParaRPr lang="en-US" sz="1400" dirty="0">
-              <a:solidFill>
-                <a:schemeClr val="accent2"/>
-              </a:solidFill>
-              <a:latin typeface="Roboto Light" charset="0"/>
-              <a:ea typeface="Roboto Light" charset="0"/>
-              <a:cs typeface="Roboto Light" charset="0"/>
-            </a:endParaRPr>
-          </a:p>
-          <a:p>
-            <a:pPr marL="285750" indent="-285750">
-              <a:lnSpc>
-                <a:spcPct val="200000"/>
-              </a:lnSpc>
-              <a:buFont typeface="Arial" panose="020B0604020202020204" pitchFamily="34" charset="0"/>
-              <a:buChar char="•"/>
-            </a:pPr>
-            <a:r>
-              <a:rPr lang="en-US" sz="1400" dirty="0">
-                <a:solidFill>
-                  <a:schemeClr val="accent2"/>
-                </a:solidFill>
-                <a:latin typeface="Roboto Light" charset="0"/>
-                <a:ea typeface="Roboto Light" charset="0"/>
-                <a:cs typeface="Roboto Light" charset="0"/>
-              </a:rPr>
-              <a:t>MoneyThoring, </a:t>
-            </a:r>
-            <a:r>
-              <a:rPr lang="en-US" sz="1400" dirty="0" err="1">
-                <a:solidFill>
-                  <a:schemeClr val="accent2"/>
-                </a:solidFill>
-                <a:latin typeface="Roboto Light" charset="0"/>
-                <a:ea typeface="Roboto Light" charset="0"/>
-                <a:cs typeface="Roboto Light" charset="0"/>
-              </a:rPr>
-              <a:t>ou</a:t>
-            </a:r>
-            <a:r>
-              <a:rPr lang="en-US" sz="1400" dirty="0">
-                <a:solidFill>
-                  <a:schemeClr val="accent2"/>
-                </a:solidFill>
-                <a:latin typeface="Roboto Light" charset="0"/>
-                <a:ea typeface="Roboto Light" charset="0"/>
-                <a:cs typeface="Roboto Light" charset="0"/>
-              </a:rPr>
-              <a:t> comment </a:t>
-            </a:r>
-            <a:r>
-              <a:rPr lang="en-US" sz="1400" dirty="0" err="1">
-                <a:solidFill>
-                  <a:schemeClr val="accent2"/>
-                </a:solidFill>
-                <a:latin typeface="Roboto Light" charset="0"/>
-                <a:ea typeface="Roboto Light" charset="0"/>
-                <a:cs typeface="Roboto Light" charset="0"/>
-              </a:rPr>
-              <a:t>gérer</a:t>
-            </a:r>
-            <a:r>
-              <a:rPr lang="en-US" sz="1400" dirty="0">
-                <a:solidFill>
-                  <a:schemeClr val="accent2"/>
-                </a:solidFill>
-                <a:latin typeface="Roboto Light" charset="0"/>
-                <a:ea typeface="Roboto Light" charset="0"/>
-                <a:cs typeface="Roboto Light" charset="0"/>
-              </a:rPr>
-              <a:t> son capital</a:t>
-            </a:r>
-          </a:p>
-          <a:p>
-            <a:pPr marL="285750" indent="-285750">
-              <a:lnSpc>
-                <a:spcPct val="200000"/>
-              </a:lnSpc>
-              <a:buFont typeface="Arial" panose="020B0604020202020204" pitchFamily="34" charset="0"/>
-              <a:buChar char="•"/>
-            </a:pPr>
-            <a:r>
-              <a:rPr lang="en-US" sz="1400" b="1" dirty="0" err="1">
-                <a:solidFill>
-                  <a:schemeClr val="accent2"/>
-                </a:solidFill>
-                <a:latin typeface="Roboto Light" charset="0"/>
-                <a:ea typeface="Roboto Light" charset="0"/>
-                <a:cs typeface="Roboto Light" charset="0"/>
-              </a:rPr>
-              <a:t>L’équipe</a:t>
-            </a:r>
-            <a:endParaRPr lang="en-US" sz="1400" b="1" dirty="0">
-              <a:solidFill>
-                <a:schemeClr val="accent2"/>
-              </a:solidFill>
-              <a:latin typeface="Roboto Light" charset="0"/>
-              <a:ea typeface="Roboto Light" charset="0"/>
-              <a:cs typeface="Roboto Light" charset="0"/>
-            </a:endParaRPr>
-          </a:p>
-          <a:p>
-            <a:pPr marL="742950" lvl="1" indent="-285750">
-              <a:lnSpc>
-                <a:spcPct val="200000"/>
-              </a:lnSpc>
-              <a:buFont typeface="Arial" panose="020B0604020202020204" pitchFamily="34" charset="0"/>
-              <a:buChar char="•"/>
-            </a:pPr>
-            <a:r>
-              <a:rPr lang="en-US" sz="1400" b="1" dirty="0">
-                <a:solidFill>
-                  <a:schemeClr val="accent2"/>
-                </a:solidFill>
-                <a:latin typeface="Roboto Light" charset="0"/>
-                <a:ea typeface="Roboto Light" charset="0"/>
-                <a:cs typeface="Roboto Light" charset="0"/>
-              </a:rPr>
-              <a:t>GUI</a:t>
-            </a:r>
-            <a:r>
-              <a:rPr lang="en-US" sz="1400" dirty="0">
-                <a:solidFill>
-                  <a:schemeClr val="accent2"/>
-                </a:solidFill>
-                <a:latin typeface="Roboto Light" charset="0"/>
-                <a:ea typeface="Roboto Light" charset="0"/>
-                <a:cs typeface="Roboto Light" charset="0"/>
-              </a:rPr>
-              <a:t> : Bryan et François</a:t>
-            </a:r>
-          </a:p>
-          <a:p>
-            <a:pPr marL="742950" lvl="1" indent="-285750">
-              <a:lnSpc>
-                <a:spcPct val="200000"/>
-              </a:lnSpc>
-              <a:buFont typeface="Arial" panose="020B0604020202020204" pitchFamily="34" charset="0"/>
-              <a:buChar char="•"/>
-            </a:pPr>
-            <a:r>
-              <a:rPr lang="en-US" sz="1400" b="1" dirty="0">
-                <a:solidFill>
-                  <a:schemeClr val="accent2"/>
-                </a:solidFill>
-                <a:latin typeface="Roboto Light" charset="0"/>
-                <a:ea typeface="Roboto Light" charset="0"/>
-                <a:cs typeface="Roboto Light" charset="0"/>
-              </a:rPr>
-              <a:t>DAL</a:t>
-            </a:r>
-            <a:r>
-              <a:rPr lang="en-US" sz="1400" dirty="0">
-                <a:solidFill>
-                  <a:schemeClr val="accent2"/>
-                </a:solidFill>
-                <a:latin typeface="Roboto Light" charset="0"/>
-                <a:ea typeface="Roboto Light" charset="0"/>
-                <a:cs typeface="Roboto Light" charset="0"/>
-              </a:rPr>
-              <a:t> et </a:t>
-            </a:r>
-            <a:r>
-              <a:rPr lang="en-US" sz="1400" b="1" dirty="0">
-                <a:solidFill>
-                  <a:schemeClr val="accent2"/>
-                </a:solidFill>
-                <a:latin typeface="Roboto Light" charset="0"/>
-                <a:ea typeface="Roboto Light" charset="0"/>
-                <a:cs typeface="Roboto Light" charset="0"/>
-              </a:rPr>
-              <a:t>DB</a:t>
-            </a:r>
-            <a:r>
-              <a:rPr lang="en-US" sz="1400" dirty="0">
-                <a:solidFill>
-                  <a:schemeClr val="accent2"/>
-                </a:solidFill>
-                <a:latin typeface="Roboto Light" charset="0"/>
-                <a:ea typeface="Roboto Light" charset="0"/>
-                <a:cs typeface="Roboto Light" charset="0"/>
-              </a:rPr>
-              <a:t> : Guillaume et </a:t>
-            </a:r>
-            <a:r>
-              <a:rPr lang="en-US" sz="1400" dirty="0" err="1">
-                <a:solidFill>
-                  <a:schemeClr val="accent2"/>
-                </a:solidFill>
-                <a:latin typeface="Roboto Light" charset="0"/>
-                <a:ea typeface="Roboto Light" charset="0"/>
-                <a:cs typeface="Roboto Light" charset="0"/>
-              </a:rPr>
-              <a:t>Héléna</a:t>
-            </a:r>
-            <a:endParaRPr lang="en-US" sz="1400" dirty="0">
-              <a:solidFill>
-                <a:schemeClr val="accent2"/>
-              </a:solidFill>
-              <a:latin typeface="Roboto Light" charset="0"/>
-              <a:ea typeface="Roboto Light" charset="0"/>
-              <a:cs typeface="Roboto Light" charset="0"/>
-            </a:endParaRPr>
-          </a:p>
-          <a:p>
-            <a:pPr marL="742950" lvl="1" indent="-285750">
-              <a:lnSpc>
-                <a:spcPct val="200000"/>
-              </a:lnSpc>
-              <a:buFont typeface="Arial" panose="020B0604020202020204" pitchFamily="34" charset="0"/>
-              <a:buChar char="•"/>
-            </a:pPr>
-            <a:r>
-              <a:rPr lang="en-US" sz="1400" b="1" dirty="0">
-                <a:solidFill>
-                  <a:schemeClr val="accent2"/>
-                </a:solidFill>
-                <a:latin typeface="Roboto Light" charset="0"/>
-                <a:ea typeface="Roboto Light" charset="0"/>
-                <a:cs typeface="Roboto Light" charset="0"/>
-              </a:rPr>
-              <a:t>BLL</a:t>
-            </a:r>
-            <a:r>
-              <a:rPr lang="en-US" sz="1400" dirty="0">
-                <a:solidFill>
-                  <a:schemeClr val="accent2"/>
-                </a:solidFill>
-                <a:latin typeface="Roboto Light" charset="0"/>
-                <a:ea typeface="Roboto Light" charset="0"/>
-                <a:cs typeface="Roboto Light" charset="0"/>
-              </a:rPr>
-              <a:t> : Daniel et </a:t>
-            </a:r>
-            <a:r>
-              <a:rPr lang="en-US" sz="1400" dirty="0" err="1">
-                <a:solidFill>
-                  <a:schemeClr val="accent2"/>
-                </a:solidFill>
-                <a:latin typeface="Roboto Light" charset="0"/>
-                <a:ea typeface="Roboto Light" charset="0"/>
-                <a:cs typeface="Roboto Light" charset="0"/>
-              </a:rPr>
-              <a:t>Héléna</a:t>
-            </a:r>
-            <a:endParaRPr lang="en-US" sz="1400" dirty="0">
-              <a:solidFill>
-                <a:schemeClr val="accent2"/>
-              </a:solidFill>
-              <a:latin typeface="Roboto Light" charset="0"/>
-              <a:ea typeface="Roboto Light" charset="0"/>
-              <a:cs typeface="Roboto Light" charset="0"/>
-            </a:endParaRPr>
-          </a:p>
-        </p:txBody>
-      </p:sp>
-    </p:spTree>
-    <p:extLst>
-      <p:ext uri="{BB962C8B-B14F-4D97-AF65-F5344CB8AC3E}">
-        <p14:creationId xmlns:p14="http://schemas.microsoft.com/office/powerpoint/2010/main" val="1700043953"/>
-      </p:ext>
-    </p:extLst>
-  </p:cSld>
-  <p:clrMapOvr>
-    <a:masterClrMapping/>
-  </p:clrMapOvr>
-</p:sld>
-</file>
-
-<file path=ppt/slides/slide3.xml><?xml version="1.0" encoding="utf-8"?>
-<p:sld xmlns:a="http://schemas.openxmlformats.org/drawingml/2006/main" xmlns:r="http://schemas.openxmlformats.org/officeDocument/2006/relationships" xmlns:p="http://schemas.openxmlformats.org/presentationml/2006/main">
-  <p:cSld>
-    <p:bg>
-      <p:bgPr>
-        <a:solidFill>
-          <a:schemeClr val="bg1">
-            <a:lumMod val="95000"/>
-          </a:schemeClr>
-        </a:solidFill>
-        <a:effectLst/>
-      </p:bgPr>
-    </p:bg>
-    <p:spTree>
-      <p:nvGrpSpPr>
-        <p:cNvPr id="1" name=""/>
-        <p:cNvGrpSpPr/>
-        <p:nvPr/>
-      </p:nvGrpSpPr>
-      <p:grpSpPr>
-        <a:xfrm>
-          <a:off x="0" y="0"/>
-          <a:ext cx="0" cy="0"/>
-          <a:chOff x="0" y="0"/>
-          <a:chExt cx="0" cy="0"/>
-        </a:xfrm>
-      </p:grpSpPr>
       <p:sp>
         <p:nvSpPr>
           <p:cNvPr id="4" name="Slide Number Placeholder 3"/>
@@ -26341,7 +25812,7 @@
             <a:fld id="{936C95AE-7298-45E1-9514-94AFF5BED89B}" type="slidenum">
               <a:rPr lang="en-US" smtClean="0"/>
               <a:pPr/>
-              <a:t>3</a:t>
+              <a:t>2</a:t>
             </a:fld>
             <a:endParaRPr lang="en-US" dirty="0"/>
           </a:p>
@@ -26904,7 +26375,7 @@
         <p:spPr>
           <a:xfrm>
             <a:off x="807741" y="2897034"/>
-            <a:ext cx="3394976" cy="3380400"/>
+            <a:ext cx="3394976" cy="3384000"/>
           </a:xfrm>
           <a:prstGeom prst="rect">
             <a:avLst/>
@@ -27011,8 +26482,33 @@
                 <a:ea typeface="Roboto Light" charset="0"/>
                 <a:cs typeface="Roboto Light" charset="0"/>
               </a:rPr>
-              <a:t>Architecture et implementation</a:t>
+              <a:t>Architecture et </a:t>
             </a:r>
+            <a:r>
+              <a:rPr lang="en-US" sz="1400" dirty="0" err="1">
+                <a:solidFill>
+                  <a:schemeClr val="tx1">
+                    <a:lumMod val="50000"/>
+                    <a:lumOff val="50000"/>
+                  </a:schemeClr>
+                </a:solidFill>
+                <a:latin typeface="Roboto Light" charset="0"/>
+                <a:ea typeface="Roboto Light" charset="0"/>
+                <a:cs typeface="Roboto Light" charset="0"/>
+              </a:rPr>
+              <a:t>implémentation</a:t>
+            </a:r>
+            <a:endParaRPr lang="en-US" sz="1400" dirty="0">
+              <a:solidFill>
+                <a:schemeClr val="tx1">
+                  <a:lumMod val="50000"/>
+                  <a:lumOff val="50000"/>
+                </a:schemeClr>
+              </a:solidFill>
+              <a:latin typeface="Roboto Light" charset="0"/>
+              <a:ea typeface="Roboto Light" charset="0"/>
+              <a:cs typeface="Roboto Light" charset="0"/>
+            </a:endParaRPr>
           </a:p>
           <a:p>
             <a:pPr marL="380990" indent="-380990">
@@ -27094,7 +26590,7 @@
         <p:spPr>
           <a:xfrm>
             <a:off x="4425526" y="2897034"/>
-            <a:ext cx="3394976" cy="3380400"/>
+            <a:ext cx="3394976" cy="3384000"/>
           </a:xfrm>
           <a:prstGeom prst="rect">
             <a:avLst/>
@@ -27735,7 +27231,7 @@
 </p:sld>
 </file>
 
-<file path=ppt/slides/slide4.xml><?xml version="1.0" encoding="utf-8"?>
+<file path=ppt/slides/slide3.xml><?xml version="1.0" encoding="utf-8"?>
 <p:sld xmlns:a="http://schemas.openxmlformats.org/drawingml/2006/main" xmlns:r="http://schemas.openxmlformats.org/officeDocument/2006/relationships" xmlns:p="http://schemas.openxmlformats.org/presentationml/2006/main">
   <p:cSld>
     <p:bg>
@@ -27868,7 +27364,7 @@
 </p:sld>
 </file>
 
-<file path=ppt/slides/slide5.xml><?xml version="1.0" encoding="utf-8"?>
+<file path=ppt/slides/slide4.xml><?xml version="1.0" encoding="utf-8"?>
 <p:sld xmlns:a="http://schemas.openxmlformats.org/drawingml/2006/main" xmlns:r="http://schemas.openxmlformats.org/officeDocument/2006/relationships" xmlns:p="http://schemas.openxmlformats.org/presentationml/2006/main">
   <p:cSld>
     <p:bg>
@@ -27943,7 +27439,7 @@
             <a:fld id="{936C95AE-7298-45E1-9514-94AFF5BED89B}" type="slidenum">
               <a:rPr lang="en-US" smtClean="0"/>
               <a:pPr/>
-              <a:t>5</a:t>
+              <a:t>4</a:t>
             </a:fld>
             <a:endParaRPr lang="en-US" dirty="0"/>
           </a:p>
@@ -28981,7 +28477,7 @@
 </p:sld>
 </file>
 
-<file path=ppt/slides/slide6.xml><?xml version="1.0" encoding="utf-8"?>
+<file path=ppt/slides/slide5.xml><?xml version="1.0" encoding="utf-8"?>
 <p:sld xmlns:a="http://schemas.openxmlformats.org/drawingml/2006/main" xmlns:r="http://schemas.openxmlformats.org/officeDocument/2006/relationships" xmlns:p="http://schemas.openxmlformats.org/presentationml/2006/main">
   <p:cSld>
     <p:bg>
@@ -29056,7 +28552,7 @@
             <a:fld id="{936C95AE-7298-45E1-9514-94AFF5BED89B}" type="slidenum">
               <a:rPr lang="en-US" smtClean="0"/>
               <a:pPr/>
-              <a:t>6</a:t>
+              <a:t>5</a:t>
             </a:fld>
             <a:endParaRPr lang="en-US" dirty="0"/>
           </a:p>
@@ -29114,7 +28610,7 @@
 </p:sld>
 </file>
 
-<file path=ppt/slides/slide7.xml><?xml version="1.0" encoding="utf-8"?>
+<file path=ppt/slides/slide6.xml><?xml version="1.0" encoding="utf-8"?>
 <p:sld xmlns:a="http://schemas.openxmlformats.org/drawingml/2006/main" xmlns:r="http://schemas.openxmlformats.org/officeDocument/2006/relationships" xmlns:p="http://schemas.openxmlformats.org/presentationml/2006/main">
   <p:cSld>
     <p:bg>
@@ -29247,7 +28743,7 @@
 </p:sld>
 </file>
 
-<file path=ppt/slides/slide8.xml><?xml version="1.0" encoding="utf-8"?>
+<file path=ppt/slides/slide7.xml><?xml version="1.0" encoding="utf-8"?>
 <p:sld xmlns:a="http://schemas.openxmlformats.org/drawingml/2006/main" xmlns:r="http://schemas.openxmlformats.org/officeDocument/2006/relationships" xmlns:p="http://schemas.openxmlformats.org/presentationml/2006/main">
   <p:cSld>
     <p:spTree>
@@ -30097,7 +29593,7 @@
                 </a:solidFill>
               </a:rPr>
               <a:pPr/>
-              <a:t>8</a:t>
+              <a:t>7</a:t>
             </a:fld>
             <a:endParaRPr lang="en-US" dirty="0">
               <a:solidFill>
@@ -32254,7 +31750,7 @@
 </p:sld>
 </file>
 
-<file path=ppt/slides/slide9.xml><?xml version="1.0" encoding="utf-8"?>
+<file path=ppt/slides/slide8.xml><?xml version="1.0" encoding="utf-8"?>
 <p:sld xmlns:a="http://schemas.openxmlformats.org/drawingml/2006/main" xmlns:r="http://schemas.openxmlformats.org/officeDocument/2006/relationships" xmlns:p="http://schemas.openxmlformats.org/presentationml/2006/main">
   <p:cSld>
     <p:spTree>
@@ -32293,12 +31789,12 @@
           </a:ln>
           <a:extLst>
             <a:ext uri="{909E8E84-426E-40dd-AFC4-6F175D3DCCD1}">
-              <a14:hiddenFill xmlns="" xmlns:a14="http://schemas.microsoft.com/office/drawing/2010/main">
+              <a14:hiddenFill xmlns:a14="http://schemas.microsoft.com/office/drawing/2010/main" xmlns="">
                 <a:noFill/>
               </a14:hiddenFill>
             </a:ext>
             <a:ext uri="{91240B29-F687-4f45-9708-019B960494DF}">
-              <a14:hiddenLine xmlns="" xmlns:a14="http://schemas.microsoft.com/office/drawing/2010/main" w="9525">
+              <a14:hiddenLine xmlns:a14="http://schemas.microsoft.com/office/drawing/2010/main" xmlns="" w="9525">
                 <a:solidFill>
                   <a:srgbClr val="000000"/>
                 </a:solidFill>
@@ -32343,12 +31839,12 @@
           </a:ln>
           <a:extLst>
             <a:ext uri="{909E8E84-426E-40dd-AFC4-6F175D3DCCD1}">
-              <a14:hiddenFill xmlns="" xmlns:a14="http://schemas.microsoft.com/office/drawing/2010/main">
+              <a14:hiddenFill xmlns:a14="http://schemas.microsoft.com/office/drawing/2010/main" xmlns="">
                 <a:noFill/>
               </a14:hiddenFill>
             </a:ext>
             <a:ext uri="{91240B29-F687-4f45-9708-019B960494DF}">
-              <a14:hiddenLine xmlns="" xmlns:a14="http://schemas.microsoft.com/office/drawing/2010/main" w="9525">
+              <a14:hiddenLine xmlns:a14="http://schemas.microsoft.com/office/drawing/2010/main" xmlns="" w="9525">
                 <a:solidFill>
                   <a:srgbClr val="000000"/>
                 </a:solidFill>
@@ -32786,7 +32282,7 @@
                 </a:solidFill>
               </a:rPr>
               <a:pPr/>
-              <a:t>9</a:t>
+              <a:t>8</a:t>
             </a:fld>
             <a:endParaRPr lang="en-US" dirty="0">
               <a:solidFill>
@@ -32836,6 +32332,139 @@
     <p:extLst>
       <p:ext uri="{BB962C8B-B14F-4D97-AF65-F5344CB8AC3E}">
         <p14:creationId xmlns:p14="http://schemas.microsoft.com/office/powerpoint/2010/main" val="1131359211"/>
+      </p:ext>
+    </p:extLst>
+  </p:cSld>
+  <p:clrMapOvr>
+    <a:masterClrMapping/>
+  </p:clrMapOvr>
+  <p:transition spd="slow">
+    <p:push dir="u"/>
+  </p:transition>
+</p:sld>
+</file>
+
+<file path=ppt/slides/slide9.xml><?xml version="1.0" encoding="utf-8"?>
+<p:sld xmlns:a="http://schemas.openxmlformats.org/drawingml/2006/main" xmlns:r="http://schemas.openxmlformats.org/officeDocument/2006/relationships" xmlns:p="http://schemas.openxmlformats.org/presentationml/2006/main">
+  <p:cSld>
+    <p:bg>
+      <p:bgPr>
+        <a:solidFill>
+          <a:schemeClr val="bg1">
+            <a:lumMod val="95000"/>
+          </a:schemeClr>
+        </a:solidFill>
+        <a:effectLst/>
+      </p:bgPr>
+    </p:bg>
+    <p:spTree>
+      <p:nvGrpSpPr>
+        <p:cNvPr id="1" name=""/>
+        <p:cNvGrpSpPr/>
+        <p:nvPr/>
+      </p:nvGrpSpPr>
+      <p:grpSpPr>
+        <a:xfrm>
+          <a:off x="0" y="0"/>
+          <a:ext cx="0" cy="0"/>
+          <a:chOff x="0" y="0"/>
+          <a:chExt cx="0" cy="0"/>
+        </a:xfrm>
+      </p:grpSpPr>
+      <p:pic>
+        <p:nvPicPr>
+          <p:cNvPr id="15" name="Picture 14">
+            <a:extLst>
+              <a:ext uri="{FF2B5EF4-FFF2-40B4-BE49-F238E27FC236}">
+                <a16:creationId xmlns:a16="http://schemas.microsoft.com/office/drawing/2014/main" id="{B5A5A9E1-8820-4F02-8952-D9EDF8BE1C33}"/>
+              </a:ext>
+            </a:extLst>
+          </p:cNvPr>
+          <p:cNvPicPr>
+            <a:picLocks noChangeAspect="1"/>
+          </p:cNvPicPr>
+          <p:nvPr/>
+        </p:nvPicPr>
+        <p:blipFill>
+          <a:blip r:embed="rId3" cstate="print">
+            <a:extLst>
+              <a:ext uri="{28A0092B-C50C-407E-A947-70E740481C1C}">
+                <a14:useLocalDpi xmlns:a14="http://schemas.microsoft.com/office/drawing/2010/main" val="0"/>
+              </a:ext>
+            </a:extLst>
+          </a:blip>
+          <a:stretch>
+            <a:fillRect/>
+          </a:stretch>
+        </p:blipFill>
+        <p:spPr>
+          <a:xfrm>
+            <a:off x="5469948" y="1587543"/>
+            <a:ext cx="1252104" cy="1083016"/>
+          </a:xfrm>
+          <a:prstGeom prst="rect">
+            <a:avLst/>
+          </a:prstGeom>
+        </p:spPr>
+      </p:pic>
+      <p:sp>
+        <p:nvSpPr>
+          <p:cNvPr id="42" name="Rectangle 41"/>
+          <p:cNvSpPr/>
+          <p:nvPr/>
+        </p:nvSpPr>
+        <p:spPr>
+          <a:xfrm>
+            <a:off x="1443135" y="3114777"/>
+            <a:ext cx="9305730" cy="707886"/>
+          </a:xfrm>
+          <a:prstGeom prst="rect">
+            <a:avLst/>
+          </a:prstGeom>
+        </p:spPr>
+        <p:txBody>
+          <a:bodyPr wrap="square">
+            <a:spAutoFit/>
+          </a:bodyPr>
+          <a:lstStyle/>
+          <a:p>
+            <a:pPr algn="ctr"/>
+            <a:r>
+              <a:rPr lang="fr-CH" sz="4000" dirty="0">
+                <a:latin typeface="Roboto Light" charset="0"/>
+                <a:ea typeface="Roboto Light" charset="0"/>
+                <a:cs typeface="Roboto Light" charset="0"/>
+              </a:rPr>
+              <a:t>Analyse</a:t>
+            </a:r>
+            <a:r>
+              <a:rPr lang="en-US" sz="4000" dirty="0">
+                <a:latin typeface="Roboto Light" charset="0"/>
+                <a:ea typeface="Roboto Light" charset="0"/>
+                <a:cs typeface="Roboto Light" charset="0"/>
+              </a:rPr>
+              <a:t> du </a:t>
+            </a:r>
+            <a:r>
+              <a:rPr lang="en-US" sz="4000" dirty="0" err="1">
+                <a:latin typeface="Roboto Light" charset="0"/>
+                <a:ea typeface="Roboto Light" charset="0"/>
+                <a:cs typeface="Roboto Light" charset="0"/>
+              </a:rPr>
+              <a:t>projet</a:t>
+            </a:r>
+            <a:endParaRPr lang="en-US" sz="4000" dirty="0">
+              <a:latin typeface="Roboto Light" charset="0"/>
+              <a:ea typeface="Roboto Light" charset="0"/>
+              <a:cs typeface="Roboto Light" charset="0"/>
+            </a:endParaRPr>
+          </a:p>
+        </p:txBody>
+      </p:sp>
+    </p:spTree>
+    <p:extLst>
+      <p:ext uri="{BB962C8B-B14F-4D97-AF65-F5344CB8AC3E}">
+        <p14:creationId xmlns:p14="http://schemas.microsoft.com/office/powerpoint/2010/main" val="616704923"/>
       </p:ext>
     </p:extLst>
   </p:cSld>

</xml_diff>